<commit_message>
Trying to optimize ANN classification.
</commit_message>
<xml_diff>
--- a/docs/final_documentation/Präsentation_gruppe3.pptx
+++ b/docs/final_documentation/Präsentation_gruppe3.pptx
@@ -5884,7 +5884,12 @@
             <p:ph type="title"/>
           </p:nvPr>
         </p:nvSpPr>
-        <p:spPr/>
+        <p:spPr>
+          <a:xfrm>
+            <a:off x="899592" y="1429484"/>
+            <a:ext cx="7704138" cy="792162"/>
+          </a:xfrm>
+        </p:spPr>
         <p:txBody>
           <a:bodyPr/>
           <a:lstStyle/>

</xml_diff>